<commit_message>
Further work on pres
</commit_message>
<xml_diff>
--- a/companies/Bosch/presentation/Presentation.pptx
+++ b/companies/Bosch/presentation/Presentation.pptx
@@ -5,7 +5,7 @@
     <p:sldMasterId id="2147483648" r:id="rId1"/>
   </p:sldMasterIdLst>
   <p:notesMasterIdLst>
-    <p:notesMasterId r:id="rId10"/>
+    <p:notesMasterId r:id="rId11"/>
   </p:notesMasterIdLst>
   <p:sldIdLst>
     <p:sldId id="256" r:id="rId2"/>
@@ -15,7 +15,8 @@
     <p:sldId id="260" r:id="rId6"/>
     <p:sldId id="261" r:id="rId7"/>
     <p:sldId id="262" r:id="rId8"/>
-    <p:sldId id="263" r:id="rId9"/>
+    <p:sldId id="264" r:id="rId9"/>
+    <p:sldId id="263" r:id="rId10"/>
   </p:sldIdLst>
   <p:sldSz cx="12192000" cy="6858000"/>
   <p:notesSz cx="6858000" cy="9144000"/>
@@ -204,7 +205,7 @@
           <a:p>
             <a:fld id="{BFE6F66D-FDA9-431D-8FC6-071027240D66}" type="datetimeFigureOut">
               <a:rPr lang="en-GB" smtClean="0"/>
-              <a:t>22/11/2016</a:t>
+              <a:t>25/11/2016</a:t>
             </a:fld>
             <a:endParaRPr lang="en-GB"/>
           </a:p>
@@ -556,6 +557,90 @@
 </p:notes>
 </file>
 
+<file path=ppt/notesSlides/notesSlide2.xml><?xml version="1.0" encoding="utf-8"?>
+<p:notes xmlns:a="http://schemas.openxmlformats.org/drawingml/2006/main" xmlns:r="http://schemas.openxmlformats.org/officeDocument/2006/relationships" xmlns:p="http://schemas.openxmlformats.org/presentationml/2006/main">
+  <p:cSld>
+    <p:spTree>
+      <p:nvGrpSpPr>
+        <p:cNvPr id="1" name=""/>
+        <p:cNvGrpSpPr/>
+        <p:nvPr/>
+      </p:nvGrpSpPr>
+      <p:grpSpPr>
+        <a:xfrm>
+          <a:off x="0" y="0"/>
+          <a:ext cx="0" cy="0"/>
+          <a:chOff x="0" y="0"/>
+          <a:chExt cx="0" cy="0"/>
+        </a:xfrm>
+      </p:grpSpPr>
+      <p:sp>
+        <p:nvSpPr>
+          <p:cNvPr id="2" name="Slide Image Placeholder 1"/>
+          <p:cNvSpPr>
+            <a:spLocks noGrp="1" noRot="1" noChangeAspect="1"/>
+          </p:cNvSpPr>
+          <p:nvPr>
+            <p:ph type="sldImg"/>
+          </p:nvPr>
+        </p:nvSpPr>
+        <p:spPr/>
+      </p:sp>
+      <p:sp>
+        <p:nvSpPr>
+          <p:cNvPr id="3" name="Notes Placeholder 2"/>
+          <p:cNvSpPr>
+            <a:spLocks noGrp="1"/>
+          </p:cNvSpPr>
+          <p:nvPr>
+            <p:ph type="body" idx="1"/>
+          </p:nvPr>
+        </p:nvSpPr>
+        <p:spPr/>
+        <p:txBody>
+          <a:bodyPr/>
+          <a:lstStyle/>
+          <a:p>
+            <a:endParaRPr lang="en-GB" dirty="0"/>
+          </a:p>
+        </p:txBody>
+      </p:sp>
+      <p:sp>
+        <p:nvSpPr>
+          <p:cNvPr id="4" name="Slide Number Placeholder 3"/>
+          <p:cNvSpPr>
+            <a:spLocks noGrp="1"/>
+          </p:cNvSpPr>
+          <p:nvPr>
+            <p:ph type="sldNum" sz="quarter" idx="10"/>
+          </p:nvPr>
+        </p:nvSpPr>
+        <p:spPr/>
+        <p:txBody>
+          <a:bodyPr/>
+          <a:lstStyle/>
+          <a:p>
+            <a:fld id="{CF3F716E-B8BF-4B99-8587-2EAB2DC2E1C5}" type="slidenum">
+              <a:rPr lang="en-GB" smtClean="0"/>
+              <a:t>4</a:t>
+            </a:fld>
+            <a:endParaRPr lang="en-GB"/>
+          </a:p>
+        </p:txBody>
+      </p:sp>
+    </p:spTree>
+    <p:extLst>
+      <p:ext uri="{BB962C8B-B14F-4D97-AF65-F5344CB8AC3E}">
+        <p14:creationId xmlns:p14="http://schemas.microsoft.com/office/powerpoint/2010/main" val="2456199043"/>
+      </p:ext>
+    </p:extLst>
+  </p:cSld>
+  <p:clrMapOvr>
+    <a:masterClrMapping/>
+  </p:clrMapOvr>
+</p:notes>
+</file>
+
 <file path=ppt/slideLayouts/slideLayout1.xml><?xml version="1.0" encoding="utf-8"?>
 <p:sldLayout xmlns:a="http://schemas.openxmlformats.org/drawingml/2006/main" xmlns:r="http://schemas.openxmlformats.org/officeDocument/2006/relationships" xmlns:p="http://schemas.openxmlformats.org/presentationml/2006/main" type="title" preserve="1">
   <p:cSld name="Title Slide">
@@ -685,9 +770,9 @@
           <a:bodyPr/>
           <a:lstStyle/>
           <a:p>
-            <a:fld id="{9AC011D0-E7EE-420D-93AB-B1EF18D34070}" type="datetimeFigureOut">
+            <a:fld id="{E8493795-B318-4DC5-9F42-61FCDDFD394B}" type="datetime1">
               <a:rPr lang="en-GB" smtClean="0"/>
-              <a:t>22/11/2016</a:t>
+              <a:t>25/11/2016</a:t>
             </a:fld>
             <a:endParaRPr lang="en-GB"/>
           </a:p>
@@ -855,9 +940,9 @@
           <a:bodyPr/>
           <a:lstStyle/>
           <a:p>
-            <a:fld id="{9AC011D0-E7EE-420D-93AB-B1EF18D34070}" type="datetimeFigureOut">
+            <a:fld id="{BA130874-BF61-4F09-8C35-1685929C9297}" type="datetime1">
               <a:rPr lang="en-GB" smtClean="0"/>
-              <a:t>22/11/2016</a:t>
+              <a:t>25/11/2016</a:t>
             </a:fld>
             <a:endParaRPr lang="en-GB"/>
           </a:p>
@@ -1035,9 +1120,9 @@
           <a:bodyPr/>
           <a:lstStyle/>
           <a:p>
-            <a:fld id="{9AC011D0-E7EE-420D-93AB-B1EF18D34070}" type="datetimeFigureOut">
+            <a:fld id="{E32B30D0-5385-4E5F-8C68-6DC353AA0811}" type="datetime1">
               <a:rPr lang="en-GB" smtClean="0"/>
-              <a:t>22/11/2016</a:t>
+              <a:t>25/11/2016</a:t>
             </a:fld>
             <a:endParaRPr lang="en-GB"/>
           </a:p>
@@ -1205,9 +1290,9 @@
           <a:bodyPr/>
           <a:lstStyle/>
           <a:p>
-            <a:fld id="{9AC011D0-E7EE-420D-93AB-B1EF18D34070}" type="datetimeFigureOut">
+            <a:fld id="{5E5C5ED3-E9E3-4FA3-A334-08EA4CC3679E}" type="datetime1">
               <a:rPr lang="en-GB" smtClean="0"/>
-              <a:t>22/11/2016</a:t>
+              <a:t>25/11/2016</a:t>
             </a:fld>
             <a:endParaRPr lang="en-GB"/>
           </a:p>
@@ -1831,9 +1916,9 @@
           <a:bodyPr/>
           <a:lstStyle/>
           <a:p>
-            <a:fld id="{9AC011D0-E7EE-420D-93AB-B1EF18D34070}" type="datetimeFigureOut">
+            <a:fld id="{088EE818-CEA8-4C2E-B8C1-44C6D7A0AD5E}" type="datetime1">
               <a:rPr lang="en-GB" smtClean="0"/>
-              <a:t>22/11/2016</a:t>
+              <a:t>25/11/2016</a:t>
             </a:fld>
             <a:endParaRPr lang="en-GB"/>
           </a:p>
@@ -2063,9 +2148,9 @@
           <a:bodyPr/>
           <a:lstStyle/>
           <a:p>
-            <a:fld id="{9AC011D0-E7EE-420D-93AB-B1EF18D34070}" type="datetimeFigureOut">
+            <a:fld id="{5FF8885D-3C24-49C9-9E3F-431C80667E8E}" type="datetime1">
               <a:rPr lang="en-GB" smtClean="0"/>
-              <a:t>22/11/2016</a:t>
+              <a:t>25/11/2016</a:t>
             </a:fld>
             <a:endParaRPr lang="en-GB"/>
           </a:p>
@@ -2810,9 +2895,9 @@
           <a:bodyPr/>
           <a:lstStyle/>
           <a:p>
-            <a:fld id="{9AC011D0-E7EE-420D-93AB-B1EF18D34070}" type="datetimeFigureOut">
+            <a:fld id="{F2C2DC77-D38B-4076-8287-B2FDCA1B6B8D}" type="datetime1">
               <a:rPr lang="en-GB" smtClean="0"/>
-              <a:t>22/11/2016</a:t>
+              <a:t>25/11/2016</a:t>
             </a:fld>
             <a:endParaRPr lang="en-GB"/>
           </a:p>
@@ -2928,9 +3013,9 @@
           <a:bodyPr/>
           <a:lstStyle/>
           <a:p>
-            <a:fld id="{9AC011D0-E7EE-420D-93AB-B1EF18D34070}" type="datetimeFigureOut">
+            <a:fld id="{244F0353-BBFE-481F-8ADA-A869CE496A92}" type="datetime1">
               <a:rPr lang="en-GB" smtClean="0"/>
-              <a:t>22/11/2016</a:t>
+              <a:t>25/11/2016</a:t>
             </a:fld>
             <a:endParaRPr lang="en-GB"/>
           </a:p>
@@ -3023,9 +3108,9 @@
           <a:bodyPr/>
           <a:lstStyle/>
           <a:p>
-            <a:fld id="{9AC011D0-E7EE-420D-93AB-B1EF18D34070}" type="datetimeFigureOut">
+            <a:fld id="{BF9772A7-E07C-475B-8817-AB53E9347029}" type="datetime1">
               <a:rPr lang="en-GB" smtClean="0"/>
-              <a:t>22/11/2016</a:t>
+              <a:t>25/11/2016</a:t>
             </a:fld>
             <a:endParaRPr lang="en-GB"/>
           </a:p>
@@ -3300,9 +3385,9 @@
           <a:bodyPr/>
           <a:lstStyle/>
           <a:p>
-            <a:fld id="{9AC011D0-E7EE-420D-93AB-B1EF18D34070}" type="datetimeFigureOut">
+            <a:fld id="{44EE6544-730B-4339-96B1-9470981EEB1F}" type="datetime1">
               <a:rPr lang="en-GB" smtClean="0"/>
-              <a:t>22/11/2016</a:t>
+              <a:t>25/11/2016</a:t>
             </a:fld>
             <a:endParaRPr lang="en-GB"/>
           </a:p>
@@ -3553,9 +3638,9 @@
           <a:bodyPr/>
           <a:lstStyle/>
           <a:p>
-            <a:fld id="{9AC011D0-E7EE-420D-93AB-B1EF18D34070}" type="datetimeFigureOut">
+            <a:fld id="{8C5AC4FD-BD2E-44B4-A25E-84018D776390}" type="datetime1">
               <a:rPr lang="en-GB" smtClean="0"/>
-              <a:t>22/11/2016</a:t>
+              <a:t>25/11/2016</a:t>
             </a:fld>
             <a:endParaRPr lang="en-GB"/>
           </a:p>
@@ -3766,9 +3851,9 @@
             </a:lvl1pPr>
           </a:lstStyle>
           <a:p>
-            <a:fld id="{9AC011D0-E7EE-420D-93AB-B1EF18D34070}" type="datetimeFigureOut">
+            <a:fld id="{2A734F09-5A1A-4754-ADE5-F5FB5C2AD5CD}" type="datetime1">
               <a:rPr lang="en-GB" smtClean="0"/>
-              <a:t>22/11/2016</a:t>
+              <a:t>25/11/2016</a:t>
             </a:fld>
             <a:endParaRPr lang="en-GB"/>
           </a:p>
@@ -3873,6 +3958,7 @@
     <p:sldLayoutId id="2147483658" r:id="rId10"/>
     <p:sldLayoutId id="2147483659" r:id="rId11"/>
   </p:sldLayoutIdLst>
+  <p:hf sldNum="0" hdr="0" ftr="0" dt="0"/>
   <p:txStyles>
     <p:titleStyle>
       <a:lvl1pPr algn="l" defTabSz="914400" rtl="0" eaLnBrk="1" latinLnBrk="0" hangingPunct="1">
@@ -4461,14 +4547,25 @@
           <a:p>
             <a:r>
               <a:rPr lang="en-US" dirty="0"/>
+              <a:t>Justification</a:t>
+            </a:r>
+          </a:p>
+          <a:p>
+            <a:pPr lvl="1"/>
+            <a:r>
+              <a:rPr lang="en-US" dirty="0"/>
               <a:t>Previous experience as bicycle mechanic</a:t>
             </a:r>
           </a:p>
           <a:p>
+            <a:pPr lvl="1"/>
             <a:r>
               <a:rPr lang="en-US" dirty="0"/>
               <a:t>First hand exposure to products</a:t>
             </a:r>
+          </a:p>
+          <a:p>
+            <a:endParaRPr lang="en-US" dirty="0"/>
           </a:p>
           <a:p>
             <a:r>
@@ -4618,7 +4715,23 @@
               <a:rPr lang="en-US" dirty="0"/>
               <a:t>Green transportation</a:t>
             </a:r>
-            <a:endParaRPr lang="en-GB" dirty="0"/>
+          </a:p>
+          <a:p>
+            <a:r>
+              <a:rPr lang="en-US" dirty="0"/>
+              <a:t>Rapidly increasing market</a:t>
+            </a:r>
+          </a:p>
+          <a:p>
+            <a:r>
+              <a:rPr lang="en-US" dirty="0"/>
+              <a:t>~70 – 164km range</a:t>
+            </a:r>
+            <a:r>
+              <a:rPr lang="en-US" baseline="30000" dirty="0"/>
+              <a:t>1</a:t>
+            </a:r>
+            <a:endParaRPr lang="en-GB" baseline="30000" dirty="0"/>
           </a:p>
         </p:txBody>
       </p:sp>
@@ -4652,6 +4765,48 @@
           </a:prstGeom>
         </p:spPr>
       </p:pic>
+      <p:sp>
+        <p:nvSpPr>
+          <p:cNvPr id="6" name="TextBox 5"/>
+          <p:cNvSpPr txBox="1"/>
+          <p:nvPr/>
+        </p:nvSpPr>
+        <p:spPr>
+          <a:xfrm>
+            <a:off x="838200" y="6173400"/>
+            <a:ext cx="8652029" cy="276999"/>
+          </a:xfrm>
+          <a:prstGeom prst="rect">
+            <a:avLst/>
+          </a:prstGeom>
+          <a:noFill/>
+        </p:spPr>
+        <p:txBody>
+          <a:bodyPr wrap="square" rtlCol="0">
+            <a:spAutoFit/>
+          </a:bodyPr>
+          <a:lstStyle/>
+          <a:p>
+            <a:r>
+              <a:rPr lang="en-US" sz="1200" dirty="0">
+                <a:solidFill>
+                  <a:schemeClr val="bg1">
+                    <a:lumMod val="65000"/>
+                  </a:schemeClr>
+                </a:solidFill>
+              </a:rPr>
+              <a:t>1 Calculated using Range Assistant: https://www.bosch-ebike.com/en/service/range-cockpit/</a:t>
+            </a:r>
+            <a:endParaRPr lang="en-GB" sz="1200" dirty="0">
+              <a:solidFill>
+                <a:schemeClr val="bg1">
+                  <a:lumMod val="65000"/>
+                </a:schemeClr>
+              </a:solidFill>
+            </a:endParaRPr>
+          </a:p>
+        </p:txBody>
+      </p:sp>
     </p:spTree>
     <p:extLst>
       <p:ext uri="{BB962C8B-B14F-4D97-AF65-F5344CB8AC3E}">
@@ -4727,18 +4882,41 @@
             <p:ph sz="half" idx="1"/>
           </p:nvPr>
         </p:nvSpPr>
-        <p:spPr/>
+        <p:spPr>
+          <a:xfrm>
+            <a:off x="838200" y="1825625"/>
+            <a:ext cx="5535968" cy="4351338"/>
+          </a:xfrm>
+        </p:spPr>
         <p:txBody>
           <a:bodyPr/>
           <a:lstStyle/>
           <a:p>
             <a:r>
               <a:rPr lang="en-US" dirty="0"/>
-              <a:t>Slightly controversial</a:t>
-            </a:r>
-          </a:p>
-          <a:p>
+              <a:t>Smaller market share</a:t>
+            </a:r>
+            <a:r>
+              <a:rPr lang="en-GB" dirty="0"/>
+              <a:t> though increasing</a:t>
+            </a:r>
+          </a:p>
+          <a:p>
+            <a:r>
+              <a:rPr lang="en-US" dirty="0"/>
+              <a:t>Allows for longer rides</a:t>
+            </a:r>
             <a:endParaRPr lang="en-GB" dirty="0"/>
+          </a:p>
+          <a:p>
+            <a:r>
+              <a:rPr lang="en-US" dirty="0"/>
+              <a:t>~ 45 – 90km range</a:t>
+            </a:r>
+            <a:r>
+              <a:rPr lang="en-US" baseline="30000" dirty="0"/>
+              <a:t>1</a:t>
+            </a:r>
           </a:p>
         </p:txBody>
       </p:sp>
@@ -4753,7 +4931,7 @@
           </p:nvPr>
         </p:nvPicPr>
         <p:blipFill>
-          <a:blip r:embed="rId2">
+          <a:blip r:embed="rId3">
             <a:extLst>
               <a:ext uri="{28A0092B-C50C-407E-A947-70E740481C1C}">
                 <a14:useLocalDpi xmlns:a14="http://schemas.microsoft.com/office/drawing/2010/main" val="0"/>
@@ -4771,6 +4949,48 @@
           </a:xfrm>
         </p:spPr>
       </p:pic>
+      <p:sp>
+        <p:nvSpPr>
+          <p:cNvPr id="7" name="TextBox 6"/>
+          <p:cNvSpPr txBox="1"/>
+          <p:nvPr/>
+        </p:nvSpPr>
+        <p:spPr>
+          <a:xfrm>
+            <a:off x="838200" y="6173400"/>
+            <a:ext cx="8652029" cy="276999"/>
+          </a:xfrm>
+          <a:prstGeom prst="rect">
+            <a:avLst/>
+          </a:prstGeom>
+          <a:noFill/>
+        </p:spPr>
+        <p:txBody>
+          <a:bodyPr wrap="square" rtlCol="0">
+            <a:spAutoFit/>
+          </a:bodyPr>
+          <a:lstStyle/>
+          <a:p>
+            <a:r>
+              <a:rPr lang="en-US" sz="1200" dirty="0">
+                <a:solidFill>
+                  <a:schemeClr val="bg1">
+                    <a:lumMod val="65000"/>
+                  </a:schemeClr>
+                </a:solidFill>
+              </a:rPr>
+              <a:t>1 Calculated using Range Assistant: https://www.bosch-ebike.com/en/service/range-cockpit/</a:t>
+            </a:r>
+            <a:endParaRPr lang="en-GB" sz="1200" dirty="0">
+              <a:solidFill>
+                <a:schemeClr val="bg1">
+                  <a:lumMod val="65000"/>
+                </a:schemeClr>
+              </a:solidFill>
+            </a:endParaRPr>
+          </a:p>
+        </p:txBody>
+      </p:sp>
     </p:spTree>
     <p:extLst>
       <p:ext uri="{BB962C8B-B14F-4D97-AF65-F5344CB8AC3E}">
@@ -4853,13 +5073,23 @@
           <a:p>
             <a:r>
               <a:rPr lang="en-US" dirty="0"/>
-              <a:t>Extended life</a:t>
+              <a:t>Increased capacity</a:t>
             </a:r>
           </a:p>
           <a:p>
             <a:r>
               <a:rPr lang="en-US" dirty="0"/>
-              <a:t>Reduced weight</a:t>
+              <a:t>Alternative technologies </a:t>
+            </a:r>
+            <a:r>
+              <a:rPr lang="en-US" baseline="30000" dirty="0"/>
+              <a:t>1,2</a:t>
+            </a:r>
+          </a:p>
+          <a:p>
+            <a:r>
+              <a:rPr lang="en-US" dirty="0"/>
+              <a:t>Reduced capacity loss</a:t>
             </a:r>
           </a:p>
           <a:p>
@@ -4871,15 +5101,85 @@
           <a:p>
             <a:r>
               <a:rPr lang="en-US" dirty="0"/>
-              <a:t>Wireless charging</a:t>
+              <a:t>Reduced costs</a:t>
             </a:r>
           </a:p>
           <a:p>
             <a:r>
               <a:rPr lang="en-US" dirty="0"/>
-              <a:t>Reduced costs</a:t>
-            </a:r>
-            <a:endParaRPr lang="en-GB" dirty="0"/>
+              <a:t>Improved management </a:t>
+            </a:r>
+            <a:r>
+              <a:rPr lang="en-US" baseline="30000" dirty="0"/>
+              <a:t>3</a:t>
+            </a:r>
+            <a:endParaRPr lang="en-GB" baseline="30000" dirty="0"/>
+          </a:p>
+        </p:txBody>
+      </p:sp>
+      <p:sp>
+        <p:nvSpPr>
+          <p:cNvPr id="5" name="TextBox 4"/>
+          <p:cNvSpPr txBox="1"/>
+          <p:nvPr/>
+        </p:nvSpPr>
+        <p:spPr>
+          <a:xfrm>
+            <a:off x="838200" y="5853797"/>
+            <a:ext cx="8652029" cy="646331"/>
+          </a:xfrm>
+          <a:prstGeom prst="rect">
+            <a:avLst/>
+          </a:prstGeom>
+          <a:noFill/>
+        </p:spPr>
+        <p:txBody>
+          <a:bodyPr wrap="square" rtlCol="0">
+            <a:spAutoFit/>
+          </a:bodyPr>
+          <a:lstStyle/>
+          <a:p>
+            <a:r>
+              <a:rPr lang="en-US" sz="1200" dirty="0">
+                <a:solidFill>
+                  <a:schemeClr val="bg1">
+                    <a:lumMod val="65000"/>
+                  </a:schemeClr>
+                </a:solidFill>
+              </a:rPr>
+              <a:t>1 http://www.bosch.co.uk/en/uk/newsroom_2/news_2/news-detail-page_63360.php</a:t>
+            </a:r>
+          </a:p>
+          <a:p>
+            <a:r>
+              <a:rPr lang="en-US" sz="1200" dirty="0">
+                <a:solidFill>
+                  <a:schemeClr val="bg1">
+                    <a:lumMod val="65000"/>
+                  </a:schemeClr>
+                </a:solidFill>
+              </a:rPr>
+              <a:t>2 http://www.bosch-presse.de/pressportal/en/how-bosch-is-developing-the-battery-of-the-future-43046.html</a:t>
+            </a:r>
+          </a:p>
+          <a:p>
+            <a:r>
+              <a:rPr lang="en-US" sz="1200" dirty="0">
+                <a:solidFill>
+                  <a:schemeClr val="bg1">
+                    <a:lumMod val="65000"/>
+                  </a:schemeClr>
+                </a:solidFill>
+              </a:rPr>
+              <a:t>3 http://www.bosch-presse.de/pressportal/en/facts-about-battery-technology-for-hybrid-and-electric-powertrains-42846.html</a:t>
+            </a:r>
+            <a:endParaRPr lang="en-GB" sz="1200" dirty="0">
+              <a:solidFill>
+                <a:schemeClr val="bg1">
+                  <a:lumMod val="65000"/>
+                </a:schemeClr>
+              </a:solidFill>
+            </a:endParaRPr>
           </a:p>
         </p:txBody>
       </p:sp>
@@ -4981,6 +5281,18 @@
             </a:r>
           </a:p>
           <a:p>
+            <a:r>
+              <a:rPr lang="en-US" dirty="0"/>
+              <a:t>Smarter</a:t>
+            </a:r>
+          </a:p>
+          <a:p>
+            <a:r>
+              <a:rPr lang="en-US" dirty="0"/>
+              <a:t>Integrated Gears</a:t>
+            </a:r>
+          </a:p>
+          <a:p>
             <a:endParaRPr lang="en-GB" dirty="0"/>
           </a:p>
         </p:txBody>
@@ -5057,7 +5369,7 @@
             <a:spLocks noGrp="1"/>
           </p:cNvSpPr>
           <p:nvPr>
-            <p:ph sz="half" idx="1"/>
+            <p:ph idx="1"/>
           </p:nvPr>
         </p:nvSpPr>
         <p:spPr/>
@@ -5085,47 +5397,17 @@
           <a:p>
             <a:r>
               <a:rPr lang="en-US" dirty="0"/>
-              <a:t>Components in frame</a:t>
+              <a:t>Automated shifting</a:t>
             </a:r>
           </a:p>
           <a:p>
             <a:r>
               <a:rPr lang="en-US" dirty="0"/>
-              <a:t>Automated shifting</a:t>
-            </a:r>
-            <a:endParaRPr lang="en-GB" dirty="0"/>
-          </a:p>
-        </p:txBody>
-      </p:sp>
-      <p:pic>
-        <p:nvPicPr>
-          <p:cNvPr id="6" name="Content Placeholder 5"/>
-          <p:cNvPicPr>
-            <a:picLocks noGrp="1" noChangeAspect="1"/>
-          </p:cNvPicPr>
-          <p:nvPr>
-            <p:ph sz="half" idx="2"/>
-          </p:nvPr>
-        </p:nvPicPr>
-        <p:blipFill>
-          <a:blip r:embed="rId2">
-            <a:extLst>
-              <a:ext uri="{28A0092B-C50C-407E-A947-70E740481C1C}">
-                <a14:useLocalDpi xmlns:a14="http://schemas.microsoft.com/office/drawing/2010/main" val="0"/>
-              </a:ext>
-            </a:extLst>
-          </a:blip>
-          <a:stretch>
-            <a:fillRect/>
-          </a:stretch>
-        </p:blipFill>
-        <p:spPr>
-          <a:xfrm>
-            <a:off x="6172200" y="2273848"/>
-            <a:ext cx="5181600" cy="3454892"/>
-          </a:xfrm>
-        </p:spPr>
-      </p:pic>
+              <a:t>Infrastructure</a:t>
+            </a:r>
+          </a:p>
+        </p:txBody>
+      </p:sp>
     </p:spTree>
     <p:extLst>
       <p:ext uri="{BB962C8B-B14F-4D97-AF65-F5344CB8AC3E}">
@@ -5158,6 +5440,131 @@
       </p:grpSpPr>
       <p:sp>
         <p:nvSpPr>
+          <p:cNvPr id="5" name="Title 4"/>
+          <p:cNvSpPr>
+            <a:spLocks noGrp="1"/>
+          </p:cNvSpPr>
+          <p:nvPr>
+            <p:ph type="title"/>
+          </p:nvPr>
+        </p:nvSpPr>
+        <p:spPr/>
+        <p:txBody>
+          <a:bodyPr/>
+          <a:lstStyle/>
+          <a:p>
+            <a:r>
+              <a:rPr lang="en-US" dirty="0"/>
+              <a:t>E-Bike 2030</a:t>
+            </a:r>
+            <a:endParaRPr lang="en-GB" dirty="0"/>
+          </a:p>
+        </p:txBody>
+      </p:sp>
+      <p:pic>
+        <p:nvPicPr>
+          <p:cNvPr id="8" name="Content Placeholder 5"/>
+          <p:cNvPicPr>
+            <a:picLocks noGrp="1" noChangeAspect="1"/>
+          </p:cNvPicPr>
+          <p:nvPr>
+            <p:ph sz="half" idx="2"/>
+          </p:nvPr>
+        </p:nvPicPr>
+        <p:blipFill>
+          <a:blip r:embed="rId2">
+            <a:extLst>
+              <a:ext uri="{28A0092B-C50C-407E-A947-70E740481C1C}">
+                <a14:useLocalDpi xmlns:a14="http://schemas.microsoft.com/office/drawing/2010/main" val="0"/>
+              </a:ext>
+            </a:extLst>
+          </a:blip>
+          <a:stretch>
+            <a:fillRect/>
+          </a:stretch>
+        </p:blipFill>
+        <p:spPr>
+          <a:xfrm>
+            <a:off x="6172200" y="2273848"/>
+            <a:ext cx="5181600" cy="3454892"/>
+          </a:xfrm>
+        </p:spPr>
+      </p:pic>
+      <p:pic>
+        <p:nvPicPr>
+          <p:cNvPr id="1028" name="Picture 4" descr="http://www.thecarbonfiberjournal.com/wp-content/uploads/2011/08/blacktrail1.png"/>
+          <p:cNvPicPr>
+            <a:picLocks noGrp="1" noChangeAspect="1" noChangeArrowheads="1"/>
+          </p:cNvPicPr>
+          <p:nvPr>
+            <p:ph sz="half" idx="1"/>
+          </p:nvPr>
+        </p:nvPicPr>
+        <p:blipFill>
+          <a:blip r:embed="rId3">
+            <a:extLst>
+              <a:ext uri="{28A0092B-C50C-407E-A947-70E740481C1C}">
+                <a14:useLocalDpi xmlns:a14="http://schemas.microsoft.com/office/drawing/2010/main" val="0"/>
+              </a:ext>
+            </a:extLst>
+          </a:blip>
+          <a:srcRect/>
+          <a:stretch>
+            <a:fillRect/>
+          </a:stretch>
+        </p:blipFill>
+        <p:spPr bwMode="auto">
+          <a:xfrm>
+            <a:off x="838200" y="2677733"/>
+            <a:ext cx="5181600" cy="2647121"/>
+          </a:xfrm>
+          <a:prstGeom prst="rect">
+            <a:avLst/>
+          </a:prstGeom>
+          <a:noFill/>
+          <a:extLst>
+            <a:ext uri="{909E8E84-426E-40DD-AFC4-6F175D3DCCD1}">
+              <a14:hiddenFill xmlns:a14="http://schemas.microsoft.com/office/drawing/2010/main">
+                <a:solidFill>
+                  <a:srgbClr val="FFFFFF"/>
+                </a:solidFill>
+              </a14:hiddenFill>
+            </a:ext>
+          </a:extLst>
+        </p:spPr>
+      </p:pic>
+    </p:spTree>
+    <p:extLst>
+      <p:ext uri="{BB962C8B-B14F-4D97-AF65-F5344CB8AC3E}">
+        <p14:creationId xmlns:p14="http://schemas.microsoft.com/office/powerpoint/2010/main" val="1770600529"/>
+      </p:ext>
+    </p:extLst>
+  </p:cSld>
+  <p:clrMapOvr>
+    <a:masterClrMapping/>
+  </p:clrMapOvr>
+</p:sld>
+</file>
+
+<file path=ppt/slides/slide9.xml><?xml version="1.0" encoding="utf-8"?>
+<p:sld xmlns:a="http://schemas.openxmlformats.org/drawingml/2006/main" xmlns:r="http://schemas.openxmlformats.org/officeDocument/2006/relationships" xmlns:p="http://schemas.openxmlformats.org/presentationml/2006/main">
+  <p:cSld>
+    <p:spTree>
+      <p:nvGrpSpPr>
+        <p:cNvPr id="1" name=""/>
+        <p:cNvGrpSpPr/>
+        <p:nvPr/>
+      </p:nvGrpSpPr>
+      <p:grpSpPr>
+        <a:xfrm>
+          <a:off x="0" y="0"/>
+          <a:ext cx="0" cy="0"/>
+          <a:chOff x="0" y="0"/>
+          <a:chExt cx="0" cy="0"/>
+        </a:xfrm>
+      </p:grpSpPr>
+      <p:sp>
+        <p:nvSpPr>
           <p:cNvPr id="2" name="Title 1"/>
           <p:cNvSpPr>
             <a:spLocks noGrp="1"/>
@@ -5194,7 +5601,31 @@
           <a:bodyPr/>
           <a:lstStyle/>
           <a:p>
-            <a:endParaRPr lang="en-GB"/>
+            <a:r>
+              <a:rPr lang="en-US" dirty="0"/>
+              <a:t>Rapidly growing market</a:t>
+            </a:r>
+          </a:p>
+          <a:p>
+            <a:r>
+              <a:rPr lang="en-US" dirty="0"/>
+              <a:t>Here to stay</a:t>
+            </a:r>
+          </a:p>
+          <a:p>
+            <a:r>
+              <a:rPr lang="en-US" dirty="0"/>
+              <a:t>Cheaper</a:t>
+            </a:r>
+          </a:p>
+          <a:p>
+            <a:r>
+              <a:rPr lang="en-US" dirty="0"/>
+              <a:t>More power</a:t>
+            </a:r>
+          </a:p>
+          <a:p>
+            <a:endParaRPr lang="en-US" dirty="0"/>
           </a:p>
         </p:txBody>
       </p:sp>

</xml_diff>